<commit_message>
Update ppt slides; add BEAST attack paper to readme
</commit_message>
<xml_diff>
--- a/CSE5473_Project_Jangid_Shaffer_Lewantowicz.pptx
+++ b/CSE5473_Project_Jangid_Shaffer_Lewantowicz.pptx
@@ -220,7 +220,7 @@
           <a:p>
             <a:fld id="{59041DB8-B66F-4DC8-A96E-33677E0F90FF}" type="datetimeFigureOut">
               <a:rPr lang="en-US" smtClean="0"/>
-              <a:t>3/25/2018</a:t>
+              <a:t>3/26/2018</a:t>
             </a:fld>
             <a:endParaRPr lang="en-US" dirty="0"/>
           </a:p>
@@ -385,7 +385,7 @@
           <a:p>
             <a:fld id="{DEB49C4A-65AC-492D-9701-81B46C3AD0E4}" type="datetimeFigureOut">
               <a:rPr lang="en-US" smtClean="0"/>
-              <a:t>3/25/2018</a:t>
+              <a:t>3/26/2018</a:t>
             </a:fld>
             <a:endParaRPr lang="en-US" dirty="0"/>
           </a:p>
@@ -3711,7 +3711,7 @@
           <a:p>
             <a:fld id="{384A29A4-78C8-47AB-BA06-22CB45938951}" type="datetime1">
               <a:rPr lang="en-US" smtClean="0"/>
-              <a:t>3/25/2018</a:t>
+              <a:t>3/26/2018</a:t>
             </a:fld>
             <a:endParaRPr lang="en-US" dirty="0"/>
           </a:p>
@@ -3903,7 +3903,7 @@
           <a:p>
             <a:fld id="{E1ED4ACF-2D82-46F2-A8E9-23963AA34E86}" type="datetime1">
               <a:rPr lang="en-US" smtClean="0"/>
-              <a:t>3/25/2018</a:t>
+              <a:t>3/26/2018</a:t>
             </a:fld>
             <a:endParaRPr lang="en-US" dirty="0"/>
           </a:p>
@@ -4083,7 +4083,7 @@
           <a:p>
             <a:fld id="{AE374B5B-21A0-4192-BF4C-38187F1A68D8}" type="datetime1">
               <a:rPr lang="en-US" smtClean="0"/>
-              <a:t>3/25/2018</a:t>
+              <a:t>3/26/2018</a:t>
             </a:fld>
             <a:endParaRPr lang="en-US" dirty="0"/>
           </a:p>
@@ -6421,7 +6421,7 @@
           <a:p>
             <a:fld id="{33B5CF7C-B333-48E1-A4A6-83A3C8B73AC0}" type="datetime1">
               <a:rPr lang="en-US" smtClean="0"/>
-              <a:t>3/25/2018</a:t>
+              <a:t>3/26/2018</a:t>
             </a:fld>
             <a:endParaRPr lang="en-US" dirty="0"/>
           </a:p>
@@ -6871,7 +6871,7 @@
           <a:p>
             <a:fld id="{AE320762-5CBF-4210-AB54-376B091119F8}" type="datetime1">
               <a:rPr lang="en-US" smtClean="0"/>
-              <a:t>3/25/2018</a:t>
+              <a:t>3/26/2018</a:t>
             </a:fld>
             <a:endParaRPr lang="en-US" dirty="0"/>
           </a:p>
@@ -7000,7 +7000,7 @@
           <a:p>
             <a:fld id="{7F0DB371-BF5F-4058-A212-1A908E4D2674}" type="datetime1">
               <a:rPr lang="en-US" smtClean="0"/>
-              <a:t>3/25/2018</a:t>
+              <a:t>3/26/2018</a:t>
             </a:fld>
             <a:endParaRPr lang="en-US" dirty="0"/>
           </a:p>
@@ -8930,7 +8930,7 @@
           <a:p>
             <a:fld id="{60A4083B-90AA-48CF-BAD5-00AA24D7F288}" type="datetime1">
               <a:rPr lang="en-US" smtClean="0"/>
-              <a:t>3/25/2018</a:t>
+              <a:t>3/26/2018</a:t>
             </a:fld>
             <a:endParaRPr lang="en-US" dirty="0"/>
           </a:p>
@@ -11177,7 +11177,7 @@
           <a:p>
             <a:fld id="{F5BAF629-ECA2-4CF3-B790-9D9BDED98269}" type="datetime1">
               <a:rPr lang="en-US" smtClean="0"/>
-              <a:t>3/25/2018</a:t>
+              <a:t>3/26/2018</a:t>
             </a:fld>
             <a:endParaRPr lang="en-US" dirty="0"/>
           </a:p>
@@ -15407,7 +15407,7 @@
           <a:p>
             <a:fld id="{B51B2453-8663-4C69-AF73-9FD7B1DEC5D0}" type="datetime1">
               <a:rPr lang="en-US" smtClean="0"/>
-              <a:t>3/25/2018</a:t>
+              <a:t>3/26/2018</a:t>
             </a:fld>
             <a:endParaRPr lang="en-US" dirty="0"/>
           </a:p>
@@ -15973,7 +15973,26 @@
             </a:pPr>
             <a:r>
               <a:rPr lang="en-US" sz="2000" dirty="0"/>
-              <a:t>Tasks (Poodle SSL Implementation):</a:t>
+              <a:t>1. POODLE </a:t>
+            </a:r>
+            <a:r>
+              <a:rPr lang="en-US" sz="2000" dirty="0" err="1"/>
+              <a:t>MitM</a:t>
+            </a:r>
+            <a:r>
+              <a:rPr lang="en-US" sz="2000" dirty="0"/>
+              <a:t> SSL Implementation:</a:t>
+            </a:r>
+          </a:p>
+          <a:p>
+            <a:pPr lvl="1">
+              <a:lnSpc>
+                <a:spcPct val="100000"/>
+              </a:lnSpc>
+            </a:pPr>
+            <a:r>
+              <a:rPr lang="en-US" sz="1850" dirty="0"/>
+              <a:t>Goal: Create realistic attack environment</a:t>
             </a:r>
           </a:p>
           <a:p>
@@ -15992,7 +16011,7 @@
             </a:r>
             <a:r>
               <a:rPr lang="en-US" sz="1850" dirty="0"/>
-              <a:t> 1 webserver (oracle)</a:t>
+              <a:t> 1 webserver w/certificate (padding oracle)</a:t>
             </a:r>
           </a:p>
           <a:p>
@@ -16003,15 +16022,40 @@
             </a:pPr>
             <a:r>
               <a:rPr lang="en-US" sz="1850" dirty="0"/>
-              <a:t>Proxy server (</a:t>
+              <a:t>Proxy attack server to modify client secret cookie contents</a:t>
             </a:r>
+          </a:p>
+          <a:p>
+            <a:pPr lvl="2">
+              <a:lnSpc>
+                <a:spcPct val="100000"/>
+              </a:lnSpc>
+            </a:pPr>
             <a:r>
-              <a:rPr lang="en-US" sz="1850" dirty="0" err="1"/>
-              <a:t>mitmproxy</a:t>
+              <a:rPr lang="en-US" sz="1700" dirty="0"/>
+              <a:t>Force client downgrade? (make as realistic as possible)</a:t>
             </a:r>
+          </a:p>
+          <a:p>
+            <a:pPr lvl="2">
+              <a:lnSpc>
+                <a:spcPct val="100000"/>
+              </a:lnSpc>
+            </a:pPr>
             <a:r>
-              <a:rPr lang="en-US" sz="1850" dirty="0"/>
-              <a:t> using Python to modify/redirect/replay)</a:t>
+              <a:rPr lang="en-US" sz="1700" dirty="0"/>
+              <a:t>Goal: decrypt and steal client secret HTTP cookie</a:t>
+            </a:r>
+          </a:p>
+          <a:p>
+            <a:pPr lvl="2">
+              <a:lnSpc>
+                <a:spcPct val="100000"/>
+              </a:lnSpc>
+            </a:pPr>
+            <a:r>
+              <a:rPr lang="en-US" sz="1700" dirty="0"/>
+              <a:t>SSL 3.0 CBC mode (BEAST attack: Duong 2011)</a:t>
             </a:r>
           </a:p>
           <a:p>
@@ -16022,15 +16066,23 @@
             </a:pPr>
             <a:r>
               <a:rPr lang="en-US" sz="1850" dirty="0"/>
-              <a:t>Client</a:t>
+              <a:t>Client victim browser</a:t>
             </a:r>
           </a:p>
           <a:p>
-            <a:pPr lvl="1">
+            <a:pPr lvl="2">
               <a:lnSpc>
                 <a:spcPct val="100000"/>
               </a:lnSpc>
             </a:pPr>
+            <a:r>
+              <a:rPr lang="en-US" sz="1700" dirty="0"/>
+              <a:t>Sends HTTPS requests with cookie, intercepted by </a:t>
+            </a:r>
+            <a:r>
+              <a:rPr lang="en-US" sz="1700" dirty="0" err="1"/>
+              <a:t>MitM</a:t>
+            </a:r>
             <a:endParaRPr lang="en-US" sz="1850" dirty="0"/>
           </a:p>
           <a:p>
@@ -16041,7 +16093,7 @@
             </a:pPr>
             <a:r>
               <a:rPr lang="en-US" sz="2000" dirty="0"/>
-              <a:t>Tasks (</a:t>
+              <a:t>2. </a:t>
             </a:r>
             <a:r>
               <a:rPr lang="en-US" sz="2000" dirty="0" err="1"/>
@@ -16049,7 +16101,7 @@
             </a:r>
             <a:r>
               <a:rPr lang="en-US" sz="2000" dirty="0"/>
-              <a:t> Implementation)</a:t>
+              <a:t> Implementation</a:t>
             </a:r>
           </a:p>
           <a:p>
@@ -16060,15 +16112,8 @@
             </a:pPr>
             <a:r>
               <a:rPr lang="en-US" sz="1850" dirty="0"/>
-              <a:t>SSL/TLS?? w/ PKCS1v1.5</a:t>
+              <a:t>TLS server w/ RSA PKCS1v1.5 padding oracle</a:t>
             </a:r>
-          </a:p>
-          <a:p>
-            <a:pPr>
-              <a:lnSpc>
-                <a:spcPct val="100000"/>
-              </a:lnSpc>
-            </a:pPr>
             <a:endParaRPr lang="en-US" sz="2000" dirty="0"/>
           </a:p>
           <a:p>
@@ -16079,7 +16124,7 @@
             </a:pPr>
             <a:r>
               <a:rPr lang="en-US" sz="2000" dirty="0"/>
-              <a:t>Tasks (</a:t>
+              <a:t>3. Tasks (</a:t>
             </a:r>
             <a:r>
               <a:rPr lang="en-US" sz="2000" dirty="0" err="1"/>
@@ -16107,17 +16152,6 @@
             <a:r>
               <a:rPr lang="en-US" sz="1850" dirty="0"/>
               <a:t> Detection Tool</a:t>
-            </a:r>
-          </a:p>
-          <a:p>
-            <a:pPr>
-              <a:lnSpc>
-                <a:spcPct val="100000"/>
-              </a:lnSpc>
-            </a:pPr>
-            <a:r>
-              <a:rPr lang="en-US" sz="2000" dirty="0"/>
-              <a:t>Option: Poodle against TLS variant</a:t>
             </a:r>
           </a:p>
         </p:txBody>

</xml_diff>